<commit_message>
Modificaciones en presentación, correspondientes a nueva tabla originada tras lo cambios.
</commit_message>
<xml_diff>
--- a/Ppt proyecto final.pptx
+++ b/Ppt proyecto final.pptx
@@ -9,7 +9,10 @@
     <p:sldId id="257" r:id="rId3"/>
     <p:sldId id="258" r:id="rId4"/>
     <p:sldId id="259" r:id="rId5"/>
-    <p:sldId id="262" r:id="rId6"/>
+    <p:sldId id="263" r:id="rId6"/>
+    <p:sldId id="262" r:id="rId7"/>
+    <p:sldId id="264" r:id="rId8"/>
+    <p:sldId id="265" r:id="rId9"/>
   </p:sldIdLst>
   <p:sldSz cx="9144000" cy="6858000" type="screen4x3"/>
   <p:notesSz cx="6858000" cy="9144000"/>
@@ -769,7 +772,7 @@
           <a:p>
             <a:fld id="{433DFE10-400E-4A45-AF27-5FC543E0B242}" type="datetimeFigureOut">
               <a:rPr lang="es-CL" smtClean="0"/>
-              <a:t>25-01-2019</a:t>
+              <a:t>26-01-2019</a:t>
             </a:fld>
             <a:endParaRPr lang="es-CL"/>
           </a:p>
@@ -952,7 +955,7 @@
           <a:p>
             <a:fld id="{433DFE10-400E-4A45-AF27-5FC543E0B242}" type="datetimeFigureOut">
               <a:rPr lang="es-CL" smtClean="0"/>
-              <a:t>25-01-2019</a:t>
+              <a:t>26-01-2019</a:t>
             </a:fld>
             <a:endParaRPr lang="es-CL"/>
           </a:p>
@@ -1127,7 +1130,7 @@
           <a:p>
             <a:fld id="{433DFE10-400E-4A45-AF27-5FC543E0B242}" type="datetimeFigureOut">
               <a:rPr lang="es-CL" smtClean="0"/>
-              <a:t>25-01-2019</a:t>
+              <a:t>26-01-2019</a:t>
             </a:fld>
             <a:endParaRPr lang="es-CL"/>
           </a:p>
@@ -1292,7 +1295,7 @@
           <a:p>
             <a:fld id="{433DFE10-400E-4A45-AF27-5FC543E0B242}" type="datetimeFigureOut">
               <a:rPr lang="es-CL" smtClean="0"/>
-              <a:t>25-01-2019</a:t>
+              <a:t>26-01-2019</a:t>
             </a:fld>
             <a:endParaRPr lang="es-CL"/>
           </a:p>
@@ -1513,7 +1516,7 @@
           <a:p>
             <a:fld id="{433DFE10-400E-4A45-AF27-5FC543E0B242}" type="datetimeFigureOut">
               <a:rPr lang="es-CL" smtClean="0"/>
-              <a:t>25-01-2019</a:t>
+              <a:t>26-01-2019</a:t>
             </a:fld>
             <a:endParaRPr lang="es-CL"/>
           </a:p>
@@ -1772,7 +1775,7 @@
           <a:p>
             <a:fld id="{433DFE10-400E-4A45-AF27-5FC543E0B242}" type="datetimeFigureOut">
               <a:rPr lang="es-CL" smtClean="0"/>
-              <a:t>25-01-2019</a:t>
+              <a:t>26-01-2019</a:t>
             </a:fld>
             <a:endParaRPr lang="es-CL"/>
           </a:p>
@@ -2176,7 +2179,7 @@
           <a:p>
             <a:fld id="{433DFE10-400E-4A45-AF27-5FC543E0B242}" type="datetimeFigureOut">
               <a:rPr lang="es-CL" smtClean="0"/>
-              <a:t>25-01-2019</a:t>
+              <a:t>26-01-2019</a:t>
             </a:fld>
             <a:endParaRPr lang="es-CL"/>
           </a:p>
@@ -2307,7 +2310,7 @@
           <a:p>
             <a:fld id="{433DFE10-400E-4A45-AF27-5FC543E0B242}" type="datetimeFigureOut">
               <a:rPr lang="es-CL" smtClean="0"/>
-              <a:t>25-01-2019</a:t>
+              <a:t>26-01-2019</a:t>
             </a:fld>
             <a:endParaRPr lang="es-CL"/>
           </a:p>
@@ -2407,7 +2410,7 @@
           <a:p>
             <a:fld id="{433DFE10-400E-4A45-AF27-5FC543E0B242}" type="datetimeFigureOut">
               <a:rPr lang="es-CL" smtClean="0"/>
-              <a:t>25-01-2019</a:t>
+              <a:t>26-01-2019</a:t>
             </a:fld>
             <a:endParaRPr lang="es-CL"/>
           </a:p>
@@ -2652,7 +2655,7 @@
           <a:p>
             <a:fld id="{433DFE10-400E-4A45-AF27-5FC543E0B242}" type="datetimeFigureOut">
               <a:rPr lang="es-CL" smtClean="0"/>
-              <a:t>25-01-2019</a:t>
+              <a:t>26-01-2019</a:t>
             </a:fld>
             <a:endParaRPr lang="es-CL"/>
           </a:p>
@@ -2896,7 +2899,7 @@
           <a:p>
             <a:fld id="{433DFE10-400E-4A45-AF27-5FC543E0B242}" type="datetimeFigureOut">
               <a:rPr lang="es-CL" smtClean="0"/>
-              <a:t>25-01-2019</a:t>
+              <a:t>26-01-2019</a:t>
             </a:fld>
             <a:endParaRPr lang="es-CL"/>
           </a:p>
@@ -3720,7 +3723,7 @@
           <a:p>
             <a:fld id="{433DFE10-400E-4A45-AF27-5FC543E0B242}" type="datetimeFigureOut">
               <a:rPr lang="es-CL" smtClean="0"/>
-              <a:t>25-01-2019</a:t>
+              <a:t>26-01-2019</a:t>
             </a:fld>
             <a:endParaRPr lang="es-CL"/>
           </a:p>
@@ -4613,9 +4616,406 @@
   <p:timing>
     <p:tnLst>
       <p:par>
-        <p:cTn id="1" dur="indefinite" restart="never" nodeType="tmRoot"/>
+        <p:cTn id="1" dur="indefinite" restart="never" nodeType="tmRoot">
+          <p:childTnLst>
+            <p:seq concurrent="1" nextAc="seek">
+              <p:cTn id="2" dur="indefinite" nodeType="mainSeq">
+                <p:childTnLst>
+                  <p:par>
+                    <p:cTn id="3" fill="hold">
+                      <p:stCondLst>
+                        <p:cond delay="indefinite"/>
+                      </p:stCondLst>
+                      <p:childTnLst>
+                        <p:par>
+                          <p:cTn id="4" fill="hold">
+                            <p:stCondLst>
+                              <p:cond delay="0"/>
+                            </p:stCondLst>
+                            <p:childTnLst>
+                              <p:par>
+                                <p:cTn id="5" presetID="2" presetClass="entr" presetSubtype="4" fill="hold" nodeType="clickEffect">
+                                  <p:stCondLst>
+                                    <p:cond delay="0"/>
+                                  </p:stCondLst>
+                                  <p:childTnLst>
+                                    <p:set>
+                                      <p:cBhvr>
+                                        <p:cTn id="6" dur="1" fill="hold">
+                                          <p:stCondLst>
+                                            <p:cond delay="0"/>
+                                          </p:stCondLst>
+                                        </p:cTn>
+                                        <p:tgtEl>
+                                          <p:spTgt spid="1037"/>
+                                        </p:tgtEl>
+                                        <p:attrNameLst>
+                                          <p:attrName>style.visibility</p:attrName>
+                                        </p:attrNameLst>
+                                      </p:cBhvr>
+                                      <p:to>
+                                        <p:strVal val="visible"/>
+                                      </p:to>
+                                    </p:set>
+                                    <p:anim calcmode="lin" valueType="num">
+                                      <p:cBhvr additive="base">
+                                        <p:cTn id="7" dur="500" fill="hold"/>
+                                        <p:tgtEl>
+                                          <p:spTgt spid="1037"/>
+                                        </p:tgtEl>
+                                        <p:attrNameLst>
+                                          <p:attrName>ppt_x</p:attrName>
+                                        </p:attrNameLst>
+                                      </p:cBhvr>
+                                      <p:tavLst>
+                                        <p:tav tm="0">
+                                          <p:val>
+                                            <p:strVal val="#ppt_x"/>
+                                          </p:val>
+                                        </p:tav>
+                                        <p:tav tm="100000">
+                                          <p:val>
+                                            <p:strVal val="#ppt_x"/>
+                                          </p:val>
+                                        </p:tav>
+                                      </p:tavLst>
+                                    </p:anim>
+                                    <p:anim calcmode="lin" valueType="num">
+                                      <p:cBhvr additive="base">
+                                        <p:cTn id="8" dur="500" fill="hold"/>
+                                        <p:tgtEl>
+                                          <p:spTgt spid="1037"/>
+                                        </p:tgtEl>
+                                        <p:attrNameLst>
+                                          <p:attrName>ppt_y</p:attrName>
+                                        </p:attrNameLst>
+                                      </p:cBhvr>
+                                      <p:tavLst>
+                                        <p:tav tm="0">
+                                          <p:val>
+                                            <p:strVal val="1+#ppt_h/2"/>
+                                          </p:val>
+                                        </p:tav>
+                                        <p:tav tm="100000">
+                                          <p:val>
+                                            <p:strVal val="#ppt_y"/>
+                                          </p:val>
+                                        </p:tav>
+                                      </p:tavLst>
+                                    </p:anim>
+                                  </p:childTnLst>
+                                </p:cTn>
+                              </p:par>
+                            </p:childTnLst>
+                          </p:cTn>
+                        </p:par>
+                      </p:childTnLst>
+                    </p:cTn>
+                  </p:par>
+                  <p:par>
+                    <p:cTn id="9" fill="hold">
+                      <p:stCondLst>
+                        <p:cond delay="indefinite"/>
+                      </p:stCondLst>
+                      <p:childTnLst>
+                        <p:par>
+                          <p:cTn id="10" fill="hold">
+                            <p:stCondLst>
+                              <p:cond delay="0"/>
+                            </p:stCondLst>
+                            <p:childTnLst>
+                              <p:par>
+                                <p:cTn id="11" presetID="2" presetClass="entr" presetSubtype="4" fill="hold" nodeType="clickEffect">
+                                  <p:stCondLst>
+                                    <p:cond delay="0"/>
+                                  </p:stCondLst>
+                                  <p:childTnLst>
+                                    <p:set>
+                                      <p:cBhvr>
+                                        <p:cTn id="12" dur="1" fill="hold">
+                                          <p:stCondLst>
+                                            <p:cond delay="0"/>
+                                          </p:stCondLst>
+                                        </p:cTn>
+                                        <p:tgtEl>
+                                          <p:spTgt spid="1031"/>
+                                        </p:tgtEl>
+                                        <p:attrNameLst>
+                                          <p:attrName>style.visibility</p:attrName>
+                                        </p:attrNameLst>
+                                      </p:cBhvr>
+                                      <p:to>
+                                        <p:strVal val="visible"/>
+                                      </p:to>
+                                    </p:set>
+                                    <p:anim calcmode="lin" valueType="num">
+                                      <p:cBhvr additive="base">
+                                        <p:cTn id="13" dur="500" fill="hold"/>
+                                        <p:tgtEl>
+                                          <p:spTgt spid="1031"/>
+                                        </p:tgtEl>
+                                        <p:attrNameLst>
+                                          <p:attrName>ppt_x</p:attrName>
+                                        </p:attrNameLst>
+                                      </p:cBhvr>
+                                      <p:tavLst>
+                                        <p:tav tm="0">
+                                          <p:val>
+                                            <p:strVal val="#ppt_x"/>
+                                          </p:val>
+                                        </p:tav>
+                                        <p:tav tm="100000">
+                                          <p:val>
+                                            <p:strVal val="#ppt_x"/>
+                                          </p:val>
+                                        </p:tav>
+                                      </p:tavLst>
+                                    </p:anim>
+                                    <p:anim calcmode="lin" valueType="num">
+                                      <p:cBhvr additive="base">
+                                        <p:cTn id="14" dur="500" fill="hold"/>
+                                        <p:tgtEl>
+                                          <p:spTgt spid="1031"/>
+                                        </p:tgtEl>
+                                        <p:attrNameLst>
+                                          <p:attrName>ppt_y</p:attrName>
+                                        </p:attrNameLst>
+                                      </p:cBhvr>
+                                      <p:tavLst>
+                                        <p:tav tm="0">
+                                          <p:val>
+                                            <p:strVal val="1+#ppt_h/2"/>
+                                          </p:val>
+                                        </p:tav>
+                                        <p:tav tm="100000">
+                                          <p:val>
+                                            <p:strVal val="#ppt_y"/>
+                                          </p:val>
+                                        </p:tav>
+                                      </p:tavLst>
+                                    </p:anim>
+                                  </p:childTnLst>
+                                </p:cTn>
+                              </p:par>
+                            </p:childTnLst>
+                          </p:cTn>
+                        </p:par>
+                      </p:childTnLst>
+                    </p:cTn>
+                  </p:par>
+                  <p:par>
+                    <p:cTn id="15" fill="hold">
+                      <p:stCondLst>
+                        <p:cond delay="indefinite"/>
+                      </p:stCondLst>
+                      <p:childTnLst>
+                        <p:par>
+                          <p:cTn id="16" fill="hold">
+                            <p:stCondLst>
+                              <p:cond delay="0"/>
+                            </p:stCondLst>
+                            <p:childTnLst>
+                              <p:par>
+                                <p:cTn id="17" presetID="10" presetClass="entr" presetSubtype="0" fill="hold" grpId="0" nodeType="clickEffect">
+                                  <p:stCondLst>
+                                    <p:cond delay="0"/>
+                                  </p:stCondLst>
+                                  <p:childTnLst>
+                                    <p:set>
+                                      <p:cBhvr>
+                                        <p:cTn id="18" dur="1" fill="hold">
+                                          <p:stCondLst>
+                                            <p:cond delay="0"/>
+                                          </p:stCondLst>
+                                        </p:cTn>
+                                        <p:tgtEl>
+                                          <p:spTgt spid="10"/>
+                                        </p:tgtEl>
+                                        <p:attrNameLst>
+                                          <p:attrName>style.visibility</p:attrName>
+                                        </p:attrNameLst>
+                                      </p:cBhvr>
+                                      <p:to>
+                                        <p:strVal val="visible"/>
+                                      </p:to>
+                                    </p:set>
+                                    <p:animEffect transition="in" filter="fade">
+                                      <p:cBhvr>
+                                        <p:cTn id="19" dur="500"/>
+                                        <p:tgtEl>
+                                          <p:spTgt spid="10"/>
+                                        </p:tgtEl>
+                                      </p:cBhvr>
+                                    </p:animEffect>
+                                  </p:childTnLst>
+                                </p:cTn>
+                              </p:par>
+                            </p:childTnLst>
+                          </p:cTn>
+                        </p:par>
+                      </p:childTnLst>
+                    </p:cTn>
+                  </p:par>
+                  <p:par>
+                    <p:cTn id="20" fill="hold">
+                      <p:stCondLst>
+                        <p:cond delay="indefinite"/>
+                      </p:stCondLst>
+                      <p:childTnLst>
+                        <p:par>
+                          <p:cTn id="21" fill="hold">
+                            <p:stCondLst>
+                              <p:cond delay="0"/>
+                            </p:stCondLst>
+                            <p:childTnLst>
+                              <p:par>
+                                <p:cTn id="22" presetID="2" presetClass="entr" presetSubtype="4" fill="hold" nodeType="clickEffect">
+                                  <p:stCondLst>
+                                    <p:cond delay="0"/>
+                                  </p:stCondLst>
+                                  <p:childTnLst>
+                                    <p:set>
+                                      <p:cBhvr>
+                                        <p:cTn id="23" dur="1" fill="hold">
+                                          <p:stCondLst>
+                                            <p:cond delay="0"/>
+                                          </p:stCondLst>
+                                        </p:cTn>
+                                        <p:tgtEl>
+                                          <p:spTgt spid="1033"/>
+                                        </p:tgtEl>
+                                        <p:attrNameLst>
+                                          <p:attrName>style.visibility</p:attrName>
+                                        </p:attrNameLst>
+                                      </p:cBhvr>
+                                      <p:to>
+                                        <p:strVal val="visible"/>
+                                      </p:to>
+                                    </p:set>
+                                    <p:anim calcmode="lin" valueType="num">
+                                      <p:cBhvr additive="base">
+                                        <p:cTn id="24" dur="500" fill="hold"/>
+                                        <p:tgtEl>
+                                          <p:spTgt spid="1033"/>
+                                        </p:tgtEl>
+                                        <p:attrNameLst>
+                                          <p:attrName>ppt_x</p:attrName>
+                                        </p:attrNameLst>
+                                      </p:cBhvr>
+                                      <p:tavLst>
+                                        <p:tav tm="0">
+                                          <p:val>
+                                            <p:strVal val="#ppt_x"/>
+                                          </p:val>
+                                        </p:tav>
+                                        <p:tav tm="100000">
+                                          <p:val>
+                                            <p:strVal val="#ppt_x"/>
+                                          </p:val>
+                                        </p:tav>
+                                      </p:tavLst>
+                                    </p:anim>
+                                    <p:anim calcmode="lin" valueType="num">
+                                      <p:cBhvr additive="base">
+                                        <p:cTn id="25" dur="500" fill="hold"/>
+                                        <p:tgtEl>
+                                          <p:spTgt spid="1033"/>
+                                        </p:tgtEl>
+                                        <p:attrNameLst>
+                                          <p:attrName>ppt_y</p:attrName>
+                                        </p:attrNameLst>
+                                      </p:cBhvr>
+                                      <p:tavLst>
+                                        <p:tav tm="0">
+                                          <p:val>
+                                            <p:strVal val="1+#ppt_h/2"/>
+                                          </p:val>
+                                        </p:tav>
+                                        <p:tav tm="100000">
+                                          <p:val>
+                                            <p:strVal val="#ppt_y"/>
+                                          </p:val>
+                                        </p:tav>
+                                      </p:tavLst>
+                                    </p:anim>
+                                  </p:childTnLst>
+                                </p:cTn>
+                              </p:par>
+                            </p:childTnLst>
+                          </p:cTn>
+                        </p:par>
+                      </p:childTnLst>
+                    </p:cTn>
+                  </p:par>
+                  <p:par>
+                    <p:cTn id="26" fill="hold">
+                      <p:stCondLst>
+                        <p:cond delay="indefinite"/>
+                      </p:stCondLst>
+                      <p:childTnLst>
+                        <p:par>
+                          <p:cTn id="27" fill="hold">
+                            <p:stCondLst>
+                              <p:cond delay="0"/>
+                            </p:stCondLst>
+                            <p:childTnLst>
+                              <p:par>
+                                <p:cTn id="28" presetID="1" presetClass="entr" presetSubtype="0" fill="hold" nodeType="clickEffect">
+                                  <p:stCondLst>
+                                    <p:cond delay="0"/>
+                                  </p:stCondLst>
+                                  <p:childTnLst>
+                                    <p:set>
+                                      <p:cBhvr>
+                                        <p:cTn id="29" dur="1" fill="hold">
+                                          <p:stCondLst>
+                                            <p:cond delay="0"/>
+                                          </p:stCondLst>
+                                        </p:cTn>
+                                        <p:tgtEl>
+                                          <p:spTgt spid="1035"/>
+                                        </p:tgtEl>
+                                        <p:attrNameLst>
+                                          <p:attrName>style.visibility</p:attrName>
+                                        </p:attrNameLst>
+                                      </p:cBhvr>
+                                      <p:to>
+                                        <p:strVal val="visible"/>
+                                      </p:to>
+                                    </p:set>
+                                  </p:childTnLst>
+                                </p:cTn>
+                              </p:par>
+                            </p:childTnLst>
+                          </p:cTn>
+                        </p:par>
+                      </p:childTnLst>
+                    </p:cTn>
+                  </p:par>
+                </p:childTnLst>
+              </p:cTn>
+              <p:prevCondLst>
+                <p:cond evt="onPrev" delay="0">
+                  <p:tgtEl>
+                    <p:sldTgt/>
+                  </p:tgtEl>
+                </p:cond>
+              </p:prevCondLst>
+              <p:nextCondLst>
+                <p:cond evt="onNext" delay="0">
+                  <p:tgtEl>
+                    <p:sldTgt/>
+                  </p:tgtEl>
+                </p:cond>
+              </p:nextCondLst>
+            </p:seq>
+          </p:childTnLst>
+        </p:cTn>
       </p:par>
     </p:tnLst>
+    <p:bldLst>
+      <p:bldP spid="10" grpId="0" animBg="1"/>
+    </p:bldLst>
   </p:timing>
 </p:sld>
 </file>
@@ -4866,16 +5266,16 @@
               <a:t>  #</a:t>
             </a:r>
             <a:r>
-              <a:rPr lang="es-CL" sz="1800" dirty="0" err="1"/>
-              <a:t>Extracci?n</a:t>
+              <a:rPr lang="es-CL" sz="1800" dirty="0" smtClean="0"/>
+              <a:t>Extracción </a:t>
             </a:r>
             <a:r>
               <a:rPr lang="es-CL" sz="1800" dirty="0"/>
-              <a:t> links </a:t>
-            </a:r>
-            <a:r>
-              <a:rPr lang="es-CL" sz="1800" dirty="0" err="1"/>
-              <a:t>p?gina</a:t>
+              <a:t>links </a:t>
+            </a:r>
+            <a:r>
+              <a:rPr lang="es-CL" sz="1800" dirty="0" smtClean="0"/>
+              <a:t>página</a:t>
             </a:r>
             <a:endParaRPr lang="es-CL" sz="1800" dirty="0"/>
           </a:p>
@@ -4992,13 +5392,13 @@
   <p:clrMapOvr>
     <a:masterClrMapping/>
   </p:clrMapOvr>
-  <mc:AlternateContent xmlns:mc="http://schemas.openxmlformats.org/markup-compatibility/2006">
-    <mc:Choice xmlns:p14="http://schemas.microsoft.com/office/powerpoint/2010/main" Requires="p14">
+  <mc:AlternateContent xmlns:mc="http://schemas.openxmlformats.org/markup-compatibility/2006" xmlns:p14="http://schemas.microsoft.com/office/powerpoint/2010/main">
+    <mc:Choice Requires="p14">
       <p:transition spd="med" p14:dur="700">
         <p:fade/>
       </p:transition>
     </mc:Choice>
-    <mc:Fallback>
+    <mc:Fallback xmlns="">
       <p:transition spd="med">
         <p:fade/>
       </p:transition>
@@ -5700,37 +6100,9 @@
           <a:chExt cx="0" cy="0"/>
         </a:xfrm>
       </p:grpSpPr>
-      <p:sp>
-        <p:nvSpPr>
-          <p:cNvPr id="2" name="1 Título"/>
-          <p:cNvSpPr>
-            <a:spLocks noGrp="1"/>
-          </p:cNvSpPr>
-          <p:nvPr>
-            <p:ph type="title"/>
-          </p:nvPr>
-        </p:nvSpPr>
-        <p:spPr>
-          <a:xfrm>
-            <a:off x="0" y="404664"/>
-            <a:ext cx="8229600" cy="1066800"/>
-          </a:xfrm>
-        </p:spPr>
-        <p:txBody>
-          <a:bodyPr/>
-          <a:lstStyle/>
-          <a:p>
-            <a:r>
-              <a:rPr lang="es-CL" dirty="0" smtClean="0"/>
-              <a:t>Resultados y problema</a:t>
-            </a:r>
-            <a:endParaRPr lang="es-CL" dirty="0"/>
-          </a:p>
-        </p:txBody>
-      </p:sp>
       <p:pic>
         <p:nvPicPr>
-          <p:cNvPr id="4105" name="Picture 9"/>
+          <p:cNvPr id="1026" name="Picture 2"/>
           <p:cNvPicPr>
             <a:picLocks noChangeAspect="1" noChangeArrowheads="1"/>
           </p:cNvPicPr>
@@ -5744,13 +6116,13 @@
               </a:ext>
             </a:extLst>
           </a:blip>
-          <a:srcRect t="8430" r="56265" b="33771"/>
+          <a:srcRect l="5015" t="17410" r="51457" b="20594"/>
           <a:stretch/>
         </p:blipFill>
         <p:spPr bwMode="auto">
           <a:xfrm>
-            <a:off x="179074" y="1772816"/>
-            <a:ext cx="5076056" cy="3771668"/>
+            <a:off x="323528" y="414880"/>
+            <a:ext cx="3672407" cy="3878216"/>
           </a:xfrm>
           <a:prstGeom prst="rect">
             <a:avLst/>
@@ -5792,7 +6164,7 @@
       </p:pic>
       <p:pic>
         <p:nvPicPr>
-          <p:cNvPr id="4106" name="Picture 10"/>
+          <p:cNvPr id="1027" name="Picture 3"/>
           <p:cNvPicPr>
             <a:picLocks noChangeAspect="1" noChangeArrowheads="1"/>
           </p:cNvPicPr>
@@ -5806,13 +6178,13 @@
               </a:ext>
             </a:extLst>
           </a:blip>
-          <a:srcRect t="9889" r="67199" b="60107"/>
+          <a:srcRect l="4486" t="17764" r="51869" b="17580"/>
           <a:stretch/>
         </p:blipFill>
         <p:spPr bwMode="auto">
           <a:xfrm>
-            <a:off x="5493555" y="2604246"/>
-            <a:ext cx="3444436" cy="1771441"/>
+            <a:off x="2555776" y="1377089"/>
+            <a:ext cx="3635896" cy="3456025"/>
           </a:xfrm>
           <a:prstGeom prst="rect">
             <a:avLst/>
@@ -5852,10 +6224,1393 @@
           </a:extLst>
         </p:spPr>
       </p:pic>
+      <p:pic>
+        <p:nvPicPr>
+          <p:cNvPr id="1028" name="Picture 4"/>
+          <p:cNvPicPr>
+            <a:picLocks noChangeAspect="1" noChangeArrowheads="1"/>
+          </p:cNvPicPr>
+          <p:nvPr/>
+        </p:nvPicPr>
+        <p:blipFill rotWithShape="1">
+          <a:blip r:embed="rId4">
+            <a:extLst>
+              <a:ext uri="{28A0092B-C50C-407E-A947-70E740481C1C}">
+                <a14:useLocalDpi xmlns:a14="http://schemas.microsoft.com/office/drawing/2010/main" val="0"/>
+              </a:ext>
+            </a:extLst>
+          </a:blip>
+          <a:srcRect l="4466" t="16206" r="51071" b="23564"/>
+          <a:stretch/>
+        </p:blipFill>
+        <p:spPr bwMode="auto">
+          <a:xfrm>
+            <a:off x="5148064" y="3182024"/>
+            <a:ext cx="3635896" cy="3433644"/>
+          </a:xfrm>
+          <a:prstGeom prst="rect">
+            <a:avLst/>
+          </a:prstGeom>
+          <a:noFill/>
+          <a:ln>
+            <a:noFill/>
+          </a:ln>
+          <a:effectLst/>
+          <a:extLst>
+            <a:ext uri="{909E8E84-426E-40DD-AFC4-6F175D3DCCD1}">
+              <a14:hiddenFill xmlns:a14="http://schemas.microsoft.com/office/drawing/2010/main">
+                <a:solidFill>
+                  <a:schemeClr val="accent1"/>
+                </a:solidFill>
+              </a14:hiddenFill>
+            </a:ext>
+            <a:ext uri="{91240B29-F687-4F45-9708-019B960494DF}">
+              <a14:hiddenLine xmlns:a14="http://schemas.microsoft.com/office/drawing/2010/main" w="9525">
+                <a:solidFill>
+                  <a:schemeClr val="tx1"/>
+                </a:solidFill>
+                <a:miter lim="800000"/>
+                <a:headEnd/>
+                <a:tailEnd/>
+              </a14:hiddenLine>
+            </a:ext>
+            <a:ext uri="{AF507438-7753-43E0-B8FC-AC1667EBCBE1}">
+              <a14:hiddenEffects xmlns:a14="http://schemas.microsoft.com/office/drawing/2010/main">
+                <a:effectLst>
+                  <a:outerShdw dist="35921" dir="2700000" algn="ctr" rotWithShape="0">
+                    <a:schemeClr val="bg2"/>
+                  </a:outerShdw>
+                </a:effectLst>
+              </a14:hiddenEffects>
+            </a:ext>
+          </a:extLst>
+        </p:spPr>
+      </p:pic>
+    </p:spTree>
+    <p:extLst>
+      <p:ext uri="{BB962C8B-B14F-4D97-AF65-F5344CB8AC3E}">
+        <p14:creationId xmlns:p14="http://schemas.microsoft.com/office/powerpoint/2010/main" val="3961285007"/>
+      </p:ext>
+    </p:extLst>
+  </p:cSld>
+  <p:clrMapOvr>
+    <a:masterClrMapping/>
+  </p:clrMapOvr>
+  <p:timing>
+    <p:tnLst>
+      <p:par>
+        <p:cTn id="1" dur="indefinite" restart="never" nodeType="tmRoot">
+          <p:childTnLst>
+            <p:seq concurrent="1" nextAc="seek">
+              <p:cTn id="2" dur="indefinite" nodeType="mainSeq">
+                <p:childTnLst>
+                  <p:par>
+                    <p:cTn id="3" fill="hold">
+                      <p:stCondLst>
+                        <p:cond delay="indefinite"/>
+                      </p:stCondLst>
+                      <p:childTnLst>
+                        <p:par>
+                          <p:cTn id="4" fill="hold">
+                            <p:stCondLst>
+                              <p:cond delay="0"/>
+                            </p:stCondLst>
+                            <p:childTnLst>
+                              <p:par>
+                                <p:cTn id="5" presetID="1" presetClass="entr" presetSubtype="0" fill="hold" nodeType="clickEffect">
+                                  <p:stCondLst>
+                                    <p:cond delay="0"/>
+                                  </p:stCondLst>
+                                  <p:childTnLst>
+                                    <p:set>
+                                      <p:cBhvr>
+                                        <p:cTn id="6" dur="1" fill="hold">
+                                          <p:stCondLst>
+                                            <p:cond delay="0"/>
+                                          </p:stCondLst>
+                                        </p:cTn>
+                                        <p:tgtEl>
+                                          <p:spTgt spid="1027"/>
+                                        </p:tgtEl>
+                                        <p:attrNameLst>
+                                          <p:attrName>style.visibility</p:attrName>
+                                        </p:attrNameLst>
+                                      </p:cBhvr>
+                                      <p:to>
+                                        <p:strVal val="visible"/>
+                                      </p:to>
+                                    </p:set>
+                                  </p:childTnLst>
+                                </p:cTn>
+                              </p:par>
+                            </p:childTnLst>
+                          </p:cTn>
+                        </p:par>
+                      </p:childTnLst>
+                    </p:cTn>
+                  </p:par>
+                  <p:par>
+                    <p:cTn id="7" fill="hold">
+                      <p:stCondLst>
+                        <p:cond delay="indefinite"/>
+                      </p:stCondLst>
+                      <p:childTnLst>
+                        <p:par>
+                          <p:cTn id="8" fill="hold">
+                            <p:stCondLst>
+                              <p:cond delay="0"/>
+                            </p:stCondLst>
+                            <p:childTnLst>
+                              <p:par>
+                                <p:cTn id="9" presetID="1" presetClass="entr" presetSubtype="0" fill="hold" nodeType="clickEffect">
+                                  <p:stCondLst>
+                                    <p:cond delay="0"/>
+                                  </p:stCondLst>
+                                  <p:childTnLst>
+                                    <p:set>
+                                      <p:cBhvr>
+                                        <p:cTn id="10" dur="1" fill="hold">
+                                          <p:stCondLst>
+                                            <p:cond delay="0"/>
+                                          </p:stCondLst>
+                                        </p:cTn>
+                                        <p:tgtEl>
+                                          <p:spTgt spid="1028"/>
+                                        </p:tgtEl>
+                                        <p:attrNameLst>
+                                          <p:attrName>style.visibility</p:attrName>
+                                        </p:attrNameLst>
+                                      </p:cBhvr>
+                                      <p:to>
+                                        <p:strVal val="visible"/>
+                                      </p:to>
+                                    </p:set>
+                                  </p:childTnLst>
+                                </p:cTn>
+                              </p:par>
+                            </p:childTnLst>
+                          </p:cTn>
+                        </p:par>
+                      </p:childTnLst>
+                    </p:cTn>
+                  </p:par>
+                </p:childTnLst>
+              </p:cTn>
+              <p:prevCondLst>
+                <p:cond evt="onPrev" delay="0">
+                  <p:tgtEl>
+                    <p:sldTgt/>
+                  </p:tgtEl>
+                </p:cond>
+              </p:prevCondLst>
+              <p:nextCondLst>
+                <p:cond evt="onNext" delay="0">
+                  <p:tgtEl>
+                    <p:sldTgt/>
+                  </p:tgtEl>
+                </p:cond>
+              </p:nextCondLst>
+            </p:seq>
+          </p:childTnLst>
+        </p:cTn>
+      </p:par>
+    </p:tnLst>
+  </p:timing>
+</p:sld>
+</file>
+
+<file path=ppt/slides/slide6.xml><?xml version="1.0" encoding="utf-8"?>
+<p:sld xmlns:a="http://schemas.openxmlformats.org/drawingml/2006/main" xmlns:r="http://schemas.openxmlformats.org/officeDocument/2006/relationships" xmlns:p="http://schemas.openxmlformats.org/presentationml/2006/main">
+  <p:cSld>
+    <p:spTree>
+      <p:nvGrpSpPr>
+        <p:cNvPr id="1" name=""/>
+        <p:cNvGrpSpPr/>
+        <p:nvPr/>
+      </p:nvGrpSpPr>
+      <p:grpSpPr>
+        <a:xfrm>
+          <a:off x="0" y="0"/>
+          <a:ext cx="0" cy="0"/>
+          <a:chOff x="0" y="0"/>
+          <a:chExt cx="0" cy="0"/>
+        </a:xfrm>
+      </p:grpSpPr>
+      <p:sp>
+        <p:nvSpPr>
+          <p:cNvPr id="2" name="1 Título"/>
+          <p:cNvSpPr>
+            <a:spLocks noGrp="1"/>
+          </p:cNvSpPr>
+          <p:nvPr>
+            <p:ph type="title"/>
+          </p:nvPr>
+        </p:nvSpPr>
+        <p:spPr>
+          <a:xfrm>
+            <a:off x="0" y="404664"/>
+            <a:ext cx="8229600" cy="1066800"/>
+          </a:xfrm>
+        </p:spPr>
+        <p:txBody>
+          <a:bodyPr/>
+          <a:lstStyle/>
+          <a:p>
+            <a:r>
+              <a:rPr lang="es-CL" dirty="0" smtClean="0"/>
+              <a:t>Resultados</a:t>
+            </a:r>
+            <a:endParaRPr lang="es-CL" dirty="0"/>
+          </a:p>
+        </p:txBody>
+      </p:sp>
+      <p:pic>
+        <p:nvPicPr>
+          <p:cNvPr id="2051" name="Picture 3"/>
+          <p:cNvPicPr>
+            <a:picLocks noChangeAspect="1" noChangeArrowheads="1"/>
+          </p:cNvPicPr>
+          <p:nvPr/>
+        </p:nvPicPr>
+        <p:blipFill rotWithShape="1">
+          <a:blip r:embed="rId2">
+            <a:extLst>
+              <a:ext uri="{28A0092B-C50C-407E-A947-70E740481C1C}">
+                <a14:useLocalDpi xmlns:a14="http://schemas.microsoft.com/office/drawing/2010/main" val="0"/>
+              </a:ext>
+            </a:extLst>
+          </a:blip>
+          <a:srcRect t="8840" b="7741"/>
+          <a:stretch/>
+        </p:blipFill>
+        <p:spPr bwMode="auto">
+          <a:xfrm>
+            <a:off x="107504" y="1484784"/>
+            <a:ext cx="8719194" cy="4212000"/>
+          </a:xfrm>
+          <a:prstGeom prst="rect">
+            <a:avLst/>
+          </a:prstGeom>
+          <a:noFill/>
+          <a:ln>
+            <a:noFill/>
+          </a:ln>
+          <a:effectLst/>
+          <a:extLst>
+            <a:ext uri="{909E8E84-426E-40DD-AFC4-6F175D3DCCD1}">
+              <a14:hiddenFill xmlns:a14="http://schemas.microsoft.com/office/drawing/2010/main">
+                <a:solidFill>
+                  <a:schemeClr val="accent1"/>
+                </a:solidFill>
+              </a14:hiddenFill>
+            </a:ext>
+            <a:ext uri="{91240B29-F687-4F45-9708-019B960494DF}">
+              <a14:hiddenLine xmlns:a14="http://schemas.microsoft.com/office/drawing/2010/main" w="9525">
+                <a:solidFill>
+                  <a:schemeClr val="tx1"/>
+                </a:solidFill>
+                <a:miter lim="800000"/>
+                <a:headEnd/>
+                <a:tailEnd/>
+              </a14:hiddenLine>
+            </a:ext>
+            <a:ext uri="{AF507438-7753-43E0-B8FC-AC1667EBCBE1}">
+              <a14:hiddenEffects xmlns:a14="http://schemas.microsoft.com/office/drawing/2010/main">
+                <a:effectLst>
+                  <a:outerShdw dist="35921" dir="2700000" algn="ctr" rotWithShape="0">
+                    <a:schemeClr val="bg2"/>
+                  </a:outerShdw>
+                </a:effectLst>
+              </a14:hiddenEffects>
+            </a:ext>
+          </a:extLst>
+        </p:spPr>
+      </p:pic>
+      <p:sp>
+        <p:nvSpPr>
+          <p:cNvPr id="3" name="2 Elipse"/>
+          <p:cNvSpPr/>
+          <p:nvPr/>
+        </p:nvSpPr>
+        <p:spPr>
+          <a:xfrm>
+            <a:off x="5436096" y="2646976"/>
+            <a:ext cx="3390602" cy="288032"/>
+          </a:xfrm>
+          <a:prstGeom prst="ellipse">
+            <a:avLst/>
+          </a:prstGeom>
+          <a:noFill/>
+        </p:spPr>
+        <p:style>
+          <a:lnRef idx="2">
+            <a:schemeClr val="accent4"/>
+          </a:lnRef>
+          <a:fillRef idx="1">
+            <a:schemeClr val="lt1"/>
+          </a:fillRef>
+          <a:effectRef idx="0">
+            <a:schemeClr val="accent4"/>
+          </a:effectRef>
+          <a:fontRef idx="minor">
+            <a:schemeClr val="dk1"/>
+          </a:fontRef>
+        </p:style>
+        <p:txBody>
+          <a:bodyPr rtlCol="0" anchor="ctr"/>
+          <a:lstStyle/>
+          <a:p>
+            <a:pPr algn="ctr"/>
+            <a:endParaRPr lang="es-CL"/>
+          </a:p>
+        </p:txBody>
+      </p:sp>
+      <p:pic>
+        <p:nvPicPr>
+          <p:cNvPr id="2052" name="Picture 4"/>
+          <p:cNvPicPr>
+            <a:picLocks noChangeAspect="1" noChangeArrowheads="1"/>
+          </p:cNvPicPr>
+          <p:nvPr/>
+        </p:nvPicPr>
+        <p:blipFill rotWithShape="1">
+          <a:blip r:embed="rId3">
+            <a:extLst>
+              <a:ext uri="{28A0092B-C50C-407E-A947-70E740481C1C}">
+                <a14:useLocalDpi xmlns:a14="http://schemas.microsoft.com/office/drawing/2010/main" val="0"/>
+              </a:ext>
+            </a:extLst>
+          </a:blip>
+          <a:srcRect t="8620" b="10902"/>
+          <a:stretch/>
+        </p:blipFill>
+        <p:spPr bwMode="auto">
+          <a:xfrm>
+            <a:off x="81535" y="1484784"/>
+            <a:ext cx="8745163" cy="4212000"/>
+          </a:xfrm>
+          <a:prstGeom prst="rect">
+            <a:avLst/>
+          </a:prstGeom>
+          <a:noFill/>
+          <a:ln>
+            <a:noFill/>
+          </a:ln>
+          <a:effectLst/>
+          <a:extLst>
+            <a:ext uri="{909E8E84-426E-40DD-AFC4-6F175D3DCCD1}">
+              <a14:hiddenFill xmlns:a14="http://schemas.microsoft.com/office/drawing/2010/main">
+                <a:solidFill>
+                  <a:schemeClr val="accent1"/>
+                </a:solidFill>
+              </a14:hiddenFill>
+            </a:ext>
+            <a:ext uri="{91240B29-F687-4F45-9708-019B960494DF}">
+              <a14:hiddenLine xmlns:a14="http://schemas.microsoft.com/office/drawing/2010/main" w="9525">
+                <a:solidFill>
+                  <a:schemeClr val="tx1"/>
+                </a:solidFill>
+                <a:miter lim="800000"/>
+                <a:headEnd/>
+                <a:tailEnd/>
+              </a14:hiddenLine>
+            </a:ext>
+            <a:ext uri="{AF507438-7753-43E0-B8FC-AC1667EBCBE1}">
+              <a14:hiddenEffects xmlns:a14="http://schemas.microsoft.com/office/drawing/2010/main">
+                <a:effectLst>
+                  <a:outerShdw dist="35921" dir="2700000" algn="ctr" rotWithShape="0">
+                    <a:schemeClr val="bg2"/>
+                  </a:outerShdw>
+                </a:effectLst>
+              </a14:hiddenEffects>
+            </a:ext>
+          </a:extLst>
+        </p:spPr>
+      </p:pic>
     </p:spTree>
     <p:extLst>
       <p:ext uri="{BB962C8B-B14F-4D97-AF65-F5344CB8AC3E}">
         <p14:creationId xmlns:p14="http://schemas.microsoft.com/office/powerpoint/2010/main" val="1245504599"/>
+      </p:ext>
+    </p:extLst>
+  </p:cSld>
+  <p:clrMapOvr>
+    <a:masterClrMapping/>
+  </p:clrMapOvr>
+  <p:timing>
+    <p:tnLst>
+      <p:par>
+        <p:cTn id="1" dur="indefinite" restart="never" nodeType="tmRoot">
+          <p:childTnLst>
+            <p:seq concurrent="1" nextAc="seek">
+              <p:cTn id="2" dur="indefinite" nodeType="mainSeq">
+                <p:childTnLst>
+                  <p:par>
+                    <p:cTn id="3" fill="hold">
+                      <p:stCondLst>
+                        <p:cond delay="indefinite"/>
+                      </p:stCondLst>
+                      <p:childTnLst>
+                        <p:par>
+                          <p:cTn id="4" fill="hold">
+                            <p:stCondLst>
+                              <p:cond delay="0"/>
+                            </p:stCondLst>
+                            <p:childTnLst>
+                              <p:par>
+                                <p:cTn id="5" presetID="2" presetClass="entr" presetSubtype="4" fill="hold" grpId="0" nodeType="clickEffect">
+                                  <p:stCondLst>
+                                    <p:cond delay="0"/>
+                                  </p:stCondLst>
+                                  <p:childTnLst>
+                                    <p:set>
+                                      <p:cBhvr>
+                                        <p:cTn id="6" dur="1" fill="hold">
+                                          <p:stCondLst>
+                                            <p:cond delay="0"/>
+                                          </p:stCondLst>
+                                        </p:cTn>
+                                        <p:tgtEl>
+                                          <p:spTgt spid="3"/>
+                                        </p:tgtEl>
+                                        <p:attrNameLst>
+                                          <p:attrName>style.visibility</p:attrName>
+                                        </p:attrNameLst>
+                                      </p:cBhvr>
+                                      <p:to>
+                                        <p:strVal val="visible"/>
+                                      </p:to>
+                                    </p:set>
+                                    <p:anim calcmode="lin" valueType="num">
+                                      <p:cBhvr additive="base">
+                                        <p:cTn id="7" dur="500" fill="hold"/>
+                                        <p:tgtEl>
+                                          <p:spTgt spid="3"/>
+                                        </p:tgtEl>
+                                        <p:attrNameLst>
+                                          <p:attrName>ppt_x</p:attrName>
+                                        </p:attrNameLst>
+                                      </p:cBhvr>
+                                      <p:tavLst>
+                                        <p:tav tm="0">
+                                          <p:val>
+                                            <p:strVal val="#ppt_x"/>
+                                          </p:val>
+                                        </p:tav>
+                                        <p:tav tm="100000">
+                                          <p:val>
+                                            <p:strVal val="#ppt_x"/>
+                                          </p:val>
+                                        </p:tav>
+                                      </p:tavLst>
+                                    </p:anim>
+                                    <p:anim calcmode="lin" valueType="num">
+                                      <p:cBhvr additive="base">
+                                        <p:cTn id="8" dur="500" fill="hold"/>
+                                        <p:tgtEl>
+                                          <p:spTgt spid="3"/>
+                                        </p:tgtEl>
+                                        <p:attrNameLst>
+                                          <p:attrName>ppt_y</p:attrName>
+                                        </p:attrNameLst>
+                                      </p:cBhvr>
+                                      <p:tavLst>
+                                        <p:tav tm="0">
+                                          <p:val>
+                                            <p:strVal val="1+#ppt_h/2"/>
+                                          </p:val>
+                                        </p:tav>
+                                        <p:tav tm="100000">
+                                          <p:val>
+                                            <p:strVal val="#ppt_y"/>
+                                          </p:val>
+                                        </p:tav>
+                                      </p:tavLst>
+                                    </p:anim>
+                                  </p:childTnLst>
+                                </p:cTn>
+                              </p:par>
+                            </p:childTnLst>
+                          </p:cTn>
+                        </p:par>
+                      </p:childTnLst>
+                    </p:cTn>
+                  </p:par>
+                  <p:par>
+                    <p:cTn id="9" fill="hold">
+                      <p:stCondLst>
+                        <p:cond delay="indefinite"/>
+                      </p:stCondLst>
+                      <p:childTnLst>
+                        <p:par>
+                          <p:cTn id="10" fill="hold">
+                            <p:stCondLst>
+                              <p:cond delay="0"/>
+                            </p:stCondLst>
+                            <p:childTnLst>
+                              <p:par>
+                                <p:cTn id="11" presetID="2" presetClass="entr" presetSubtype="4" fill="hold" nodeType="clickEffect">
+                                  <p:stCondLst>
+                                    <p:cond delay="0"/>
+                                  </p:stCondLst>
+                                  <p:childTnLst>
+                                    <p:set>
+                                      <p:cBhvr>
+                                        <p:cTn id="12" dur="1" fill="hold">
+                                          <p:stCondLst>
+                                            <p:cond delay="0"/>
+                                          </p:stCondLst>
+                                        </p:cTn>
+                                        <p:tgtEl>
+                                          <p:spTgt spid="2052"/>
+                                        </p:tgtEl>
+                                        <p:attrNameLst>
+                                          <p:attrName>style.visibility</p:attrName>
+                                        </p:attrNameLst>
+                                      </p:cBhvr>
+                                      <p:to>
+                                        <p:strVal val="visible"/>
+                                      </p:to>
+                                    </p:set>
+                                    <p:anim calcmode="lin" valueType="num">
+                                      <p:cBhvr additive="base">
+                                        <p:cTn id="13" dur="500" fill="hold"/>
+                                        <p:tgtEl>
+                                          <p:spTgt spid="2052"/>
+                                        </p:tgtEl>
+                                        <p:attrNameLst>
+                                          <p:attrName>ppt_x</p:attrName>
+                                        </p:attrNameLst>
+                                      </p:cBhvr>
+                                      <p:tavLst>
+                                        <p:tav tm="0">
+                                          <p:val>
+                                            <p:strVal val="#ppt_x"/>
+                                          </p:val>
+                                        </p:tav>
+                                        <p:tav tm="100000">
+                                          <p:val>
+                                            <p:strVal val="#ppt_x"/>
+                                          </p:val>
+                                        </p:tav>
+                                      </p:tavLst>
+                                    </p:anim>
+                                    <p:anim calcmode="lin" valueType="num">
+                                      <p:cBhvr additive="base">
+                                        <p:cTn id="14" dur="500" fill="hold"/>
+                                        <p:tgtEl>
+                                          <p:spTgt spid="2052"/>
+                                        </p:tgtEl>
+                                        <p:attrNameLst>
+                                          <p:attrName>ppt_y</p:attrName>
+                                        </p:attrNameLst>
+                                      </p:cBhvr>
+                                      <p:tavLst>
+                                        <p:tav tm="0">
+                                          <p:val>
+                                            <p:strVal val="1+#ppt_h/2"/>
+                                          </p:val>
+                                        </p:tav>
+                                        <p:tav tm="100000">
+                                          <p:val>
+                                            <p:strVal val="#ppt_y"/>
+                                          </p:val>
+                                        </p:tav>
+                                      </p:tavLst>
+                                    </p:anim>
+                                  </p:childTnLst>
+                                </p:cTn>
+                              </p:par>
+                            </p:childTnLst>
+                          </p:cTn>
+                        </p:par>
+                      </p:childTnLst>
+                    </p:cTn>
+                  </p:par>
+                </p:childTnLst>
+              </p:cTn>
+              <p:prevCondLst>
+                <p:cond evt="onPrev" delay="0">
+                  <p:tgtEl>
+                    <p:sldTgt/>
+                  </p:tgtEl>
+                </p:cond>
+              </p:prevCondLst>
+              <p:nextCondLst>
+                <p:cond evt="onNext" delay="0">
+                  <p:tgtEl>
+                    <p:sldTgt/>
+                  </p:tgtEl>
+                </p:cond>
+              </p:nextCondLst>
+            </p:seq>
+          </p:childTnLst>
+        </p:cTn>
+      </p:par>
+    </p:tnLst>
+    <p:bldLst>
+      <p:bldP spid="3" grpId="0" animBg="1"/>
+    </p:bldLst>
+  </p:timing>
+</p:sld>
+</file>
+
+<file path=ppt/slides/slide7.xml><?xml version="1.0" encoding="utf-8"?>
+<p:sld xmlns:a="http://schemas.openxmlformats.org/drawingml/2006/main" xmlns:r="http://schemas.openxmlformats.org/officeDocument/2006/relationships" xmlns:p="http://schemas.openxmlformats.org/presentationml/2006/main">
+  <p:cSld>
+    <p:spTree>
+      <p:nvGrpSpPr>
+        <p:cNvPr id="1" name=""/>
+        <p:cNvGrpSpPr/>
+        <p:nvPr/>
+      </p:nvGrpSpPr>
+      <p:grpSpPr>
+        <a:xfrm>
+          <a:off x="0" y="0"/>
+          <a:ext cx="0" cy="0"/>
+          <a:chOff x="0" y="0"/>
+          <a:chExt cx="0" cy="0"/>
+        </a:xfrm>
+      </p:grpSpPr>
+      <p:sp>
+        <p:nvSpPr>
+          <p:cNvPr id="2" name="1 Título"/>
+          <p:cNvSpPr>
+            <a:spLocks noGrp="1"/>
+          </p:cNvSpPr>
+          <p:nvPr>
+            <p:ph type="title"/>
+          </p:nvPr>
+        </p:nvSpPr>
+        <p:spPr>
+          <a:xfrm>
+            <a:off x="395536" y="620688"/>
+            <a:ext cx="8229600" cy="1066800"/>
+          </a:xfrm>
+        </p:spPr>
+        <p:txBody>
+          <a:bodyPr/>
+          <a:lstStyle/>
+          <a:p>
+            <a:r>
+              <a:rPr lang="es-CL" dirty="0" smtClean="0"/>
+              <a:t>Resultados con filtro</a:t>
+            </a:r>
+            <a:endParaRPr lang="es-CL" dirty="0"/>
+          </a:p>
+        </p:txBody>
+      </p:sp>
+      <p:pic>
+        <p:nvPicPr>
+          <p:cNvPr id="3074" name="Picture 2"/>
+          <p:cNvPicPr>
+            <a:picLocks noChangeAspect="1" noChangeArrowheads="1"/>
+          </p:cNvPicPr>
+          <p:nvPr/>
+        </p:nvPicPr>
+        <p:blipFill rotWithShape="1">
+          <a:blip r:embed="rId2">
+            <a:extLst>
+              <a:ext uri="{28A0092B-C50C-407E-A947-70E740481C1C}">
+                <a14:useLocalDpi xmlns:a14="http://schemas.microsoft.com/office/drawing/2010/main" val="0"/>
+              </a:ext>
+            </a:extLst>
+          </a:blip>
+          <a:srcRect l="252" t="9847" r="51131" b="29718"/>
+          <a:stretch/>
+        </p:blipFill>
+        <p:spPr bwMode="auto">
+          <a:xfrm>
+            <a:off x="1403648" y="1680138"/>
+            <a:ext cx="5760640" cy="4025959"/>
+          </a:xfrm>
+          <a:prstGeom prst="rect">
+            <a:avLst/>
+          </a:prstGeom>
+          <a:noFill/>
+          <a:ln>
+            <a:noFill/>
+          </a:ln>
+          <a:effectLst/>
+          <a:extLst>
+            <a:ext uri="{909E8E84-426E-40DD-AFC4-6F175D3DCCD1}">
+              <a14:hiddenFill xmlns:a14="http://schemas.microsoft.com/office/drawing/2010/main">
+                <a:solidFill>
+                  <a:schemeClr val="accent1"/>
+                </a:solidFill>
+              </a14:hiddenFill>
+            </a:ext>
+            <a:ext uri="{91240B29-F687-4F45-9708-019B960494DF}">
+              <a14:hiddenLine xmlns:a14="http://schemas.microsoft.com/office/drawing/2010/main" w="9525">
+                <a:solidFill>
+                  <a:schemeClr val="tx1"/>
+                </a:solidFill>
+                <a:miter lim="800000"/>
+                <a:headEnd/>
+                <a:tailEnd/>
+              </a14:hiddenLine>
+            </a:ext>
+            <a:ext uri="{AF507438-7753-43E0-B8FC-AC1667EBCBE1}">
+              <a14:hiddenEffects xmlns:a14="http://schemas.microsoft.com/office/drawing/2010/main">
+                <a:effectLst>
+                  <a:outerShdw dist="35921" dir="2700000" algn="ctr" rotWithShape="0">
+                    <a:schemeClr val="bg2"/>
+                  </a:outerShdw>
+                </a:effectLst>
+              </a14:hiddenEffects>
+            </a:ext>
+          </a:extLst>
+        </p:spPr>
+      </p:pic>
+      <p:pic>
+        <p:nvPicPr>
+          <p:cNvPr id="3075" name="Picture 3"/>
+          <p:cNvPicPr>
+            <a:picLocks noChangeAspect="1" noChangeArrowheads="1"/>
+          </p:cNvPicPr>
+          <p:nvPr/>
+        </p:nvPicPr>
+        <p:blipFill rotWithShape="1">
+          <a:blip r:embed="rId3">
+            <a:extLst>
+              <a:ext uri="{28A0092B-C50C-407E-A947-70E740481C1C}">
+                <a14:useLocalDpi xmlns:a14="http://schemas.microsoft.com/office/drawing/2010/main" val="0"/>
+              </a:ext>
+            </a:extLst>
+          </a:blip>
+          <a:srcRect l="185" t="9644" r="50511" b="30762"/>
+          <a:stretch/>
+        </p:blipFill>
+        <p:spPr bwMode="auto">
+          <a:xfrm>
+            <a:off x="1403648" y="1680358"/>
+            <a:ext cx="5760640" cy="4025739"/>
+          </a:xfrm>
+          <a:prstGeom prst="rect">
+            <a:avLst/>
+          </a:prstGeom>
+          <a:noFill/>
+          <a:ln>
+            <a:noFill/>
+          </a:ln>
+          <a:effectLst/>
+          <a:extLst>
+            <a:ext uri="{909E8E84-426E-40DD-AFC4-6F175D3DCCD1}">
+              <a14:hiddenFill xmlns:a14="http://schemas.microsoft.com/office/drawing/2010/main">
+                <a:solidFill>
+                  <a:schemeClr val="accent1"/>
+                </a:solidFill>
+              </a14:hiddenFill>
+            </a:ext>
+            <a:ext uri="{91240B29-F687-4F45-9708-019B960494DF}">
+              <a14:hiddenLine xmlns:a14="http://schemas.microsoft.com/office/drawing/2010/main" w="9525">
+                <a:solidFill>
+                  <a:schemeClr val="tx1"/>
+                </a:solidFill>
+                <a:miter lim="800000"/>
+                <a:headEnd/>
+                <a:tailEnd/>
+              </a14:hiddenLine>
+            </a:ext>
+            <a:ext uri="{AF507438-7753-43E0-B8FC-AC1667EBCBE1}">
+              <a14:hiddenEffects xmlns:a14="http://schemas.microsoft.com/office/drawing/2010/main">
+                <a:effectLst>
+                  <a:outerShdw dist="35921" dir="2700000" algn="ctr" rotWithShape="0">
+                    <a:schemeClr val="bg2"/>
+                  </a:outerShdw>
+                </a:effectLst>
+              </a14:hiddenEffects>
+            </a:ext>
+          </a:extLst>
+        </p:spPr>
+      </p:pic>
+      <p:pic>
+        <p:nvPicPr>
+          <p:cNvPr id="3076" name="Picture 4"/>
+          <p:cNvPicPr>
+            <a:picLocks noChangeAspect="1" noChangeArrowheads="1"/>
+          </p:cNvPicPr>
+          <p:nvPr/>
+        </p:nvPicPr>
+        <p:blipFill rotWithShape="1">
+          <a:blip r:embed="rId4">
+            <a:extLst>
+              <a:ext uri="{28A0092B-C50C-407E-A947-70E740481C1C}">
+                <a14:useLocalDpi xmlns:a14="http://schemas.microsoft.com/office/drawing/2010/main" val="0"/>
+              </a:ext>
+            </a:extLst>
+          </a:blip>
+          <a:srcRect l="-374" t="9997" r="52769" b="10250"/>
+          <a:stretch/>
+        </p:blipFill>
+        <p:spPr bwMode="auto">
+          <a:xfrm>
+            <a:off x="1403648" y="1556792"/>
+            <a:ext cx="5760640" cy="5162613"/>
+          </a:xfrm>
+          <a:prstGeom prst="rect">
+            <a:avLst/>
+          </a:prstGeom>
+          <a:noFill/>
+          <a:ln>
+            <a:noFill/>
+          </a:ln>
+          <a:effectLst/>
+          <a:extLst>
+            <a:ext uri="{909E8E84-426E-40DD-AFC4-6F175D3DCCD1}">
+              <a14:hiddenFill xmlns:a14="http://schemas.microsoft.com/office/drawing/2010/main">
+                <a:solidFill>
+                  <a:schemeClr val="accent1"/>
+                </a:solidFill>
+              </a14:hiddenFill>
+            </a:ext>
+            <a:ext uri="{91240B29-F687-4F45-9708-019B960494DF}">
+              <a14:hiddenLine xmlns:a14="http://schemas.microsoft.com/office/drawing/2010/main" w="9525">
+                <a:solidFill>
+                  <a:schemeClr val="tx1"/>
+                </a:solidFill>
+                <a:miter lim="800000"/>
+                <a:headEnd/>
+                <a:tailEnd/>
+              </a14:hiddenLine>
+            </a:ext>
+            <a:ext uri="{AF507438-7753-43E0-B8FC-AC1667EBCBE1}">
+              <a14:hiddenEffects xmlns:a14="http://schemas.microsoft.com/office/drawing/2010/main">
+                <a:effectLst>
+                  <a:outerShdw dist="35921" dir="2700000" algn="ctr" rotWithShape="0">
+                    <a:schemeClr val="bg2"/>
+                  </a:outerShdw>
+                </a:effectLst>
+              </a14:hiddenEffects>
+            </a:ext>
+          </a:extLst>
+        </p:spPr>
+      </p:pic>
+      <p:sp>
+        <p:nvSpPr>
+          <p:cNvPr id="4" name="3 Elipse"/>
+          <p:cNvSpPr/>
+          <p:nvPr/>
+        </p:nvSpPr>
+        <p:spPr>
+          <a:xfrm>
+            <a:off x="2411760" y="6381328"/>
+            <a:ext cx="576064" cy="338077"/>
+          </a:xfrm>
+          <a:prstGeom prst="ellipse">
+            <a:avLst/>
+          </a:prstGeom>
+          <a:noFill/>
+        </p:spPr>
+        <p:style>
+          <a:lnRef idx="2">
+            <a:schemeClr val="accent4"/>
+          </a:lnRef>
+          <a:fillRef idx="1">
+            <a:schemeClr val="lt1"/>
+          </a:fillRef>
+          <a:effectRef idx="0">
+            <a:schemeClr val="accent4"/>
+          </a:effectRef>
+          <a:fontRef idx="minor">
+            <a:schemeClr val="dk1"/>
+          </a:fontRef>
+        </p:style>
+        <p:txBody>
+          <a:bodyPr rtlCol="0" anchor="ctr"/>
+          <a:lstStyle/>
+          <a:p>
+            <a:pPr algn="ctr"/>
+            <a:endParaRPr lang="es-CL"/>
+          </a:p>
+        </p:txBody>
+      </p:sp>
+      <p:pic>
+        <p:nvPicPr>
+          <p:cNvPr id="3077" name="Picture 5"/>
+          <p:cNvPicPr>
+            <a:picLocks noChangeAspect="1" noChangeArrowheads="1"/>
+          </p:cNvPicPr>
+          <p:nvPr/>
+        </p:nvPicPr>
+        <p:blipFill rotWithShape="1">
+          <a:blip r:embed="rId5">
+            <a:extLst>
+              <a:ext uri="{28A0092B-C50C-407E-A947-70E740481C1C}">
+                <a14:useLocalDpi xmlns:a14="http://schemas.microsoft.com/office/drawing/2010/main" val="0"/>
+              </a:ext>
+            </a:extLst>
+          </a:blip>
+          <a:srcRect t="9433" r="52133" b="10325"/>
+          <a:stretch/>
+        </p:blipFill>
+        <p:spPr bwMode="auto">
+          <a:xfrm>
+            <a:off x="1403648" y="1509807"/>
+            <a:ext cx="6125089" cy="5209598"/>
+          </a:xfrm>
+          <a:prstGeom prst="rect">
+            <a:avLst/>
+          </a:prstGeom>
+          <a:noFill/>
+          <a:ln>
+            <a:noFill/>
+          </a:ln>
+          <a:effectLst/>
+          <a:extLst>
+            <a:ext uri="{909E8E84-426E-40DD-AFC4-6F175D3DCCD1}">
+              <a14:hiddenFill xmlns:a14="http://schemas.microsoft.com/office/drawing/2010/main">
+                <a:solidFill>
+                  <a:schemeClr val="accent1"/>
+                </a:solidFill>
+              </a14:hiddenFill>
+            </a:ext>
+            <a:ext uri="{91240B29-F687-4F45-9708-019B960494DF}">
+              <a14:hiddenLine xmlns:a14="http://schemas.microsoft.com/office/drawing/2010/main" w="9525">
+                <a:solidFill>
+                  <a:schemeClr val="tx1"/>
+                </a:solidFill>
+                <a:miter lim="800000"/>
+                <a:headEnd/>
+                <a:tailEnd/>
+              </a14:hiddenLine>
+            </a:ext>
+            <a:ext uri="{AF507438-7753-43E0-B8FC-AC1667EBCBE1}">
+              <a14:hiddenEffects xmlns:a14="http://schemas.microsoft.com/office/drawing/2010/main">
+                <a:effectLst>
+                  <a:outerShdw dist="35921" dir="2700000" algn="ctr" rotWithShape="0">
+                    <a:schemeClr val="bg2"/>
+                  </a:outerShdw>
+                </a:effectLst>
+              </a14:hiddenEffects>
+            </a:ext>
+          </a:extLst>
+        </p:spPr>
+      </p:pic>
+      <p:sp>
+        <p:nvSpPr>
+          <p:cNvPr id="5" name="4 Elipse"/>
+          <p:cNvSpPr/>
+          <p:nvPr/>
+        </p:nvSpPr>
+        <p:spPr>
+          <a:xfrm>
+            <a:off x="2411760" y="6396549"/>
+            <a:ext cx="648072" cy="307634"/>
+          </a:xfrm>
+          <a:prstGeom prst="ellipse">
+            <a:avLst/>
+          </a:prstGeom>
+          <a:noFill/>
+        </p:spPr>
+        <p:style>
+          <a:lnRef idx="2">
+            <a:schemeClr val="accent4"/>
+          </a:lnRef>
+          <a:fillRef idx="1">
+            <a:schemeClr val="lt1"/>
+          </a:fillRef>
+          <a:effectRef idx="0">
+            <a:schemeClr val="accent4"/>
+          </a:effectRef>
+          <a:fontRef idx="minor">
+            <a:schemeClr val="dk1"/>
+          </a:fontRef>
+        </p:style>
+        <p:txBody>
+          <a:bodyPr rtlCol="0" anchor="ctr"/>
+          <a:lstStyle/>
+          <a:p>
+            <a:pPr algn="ctr"/>
+            <a:endParaRPr lang="es-CL"/>
+          </a:p>
+        </p:txBody>
+      </p:sp>
+    </p:spTree>
+    <p:extLst>
+      <p:ext uri="{BB962C8B-B14F-4D97-AF65-F5344CB8AC3E}">
+        <p14:creationId xmlns:p14="http://schemas.microsoft.com/office/powerpoint/2010/main" val="2105412897"/>
+      </p:ext>
+    </p:extLst>
+  </p:cSld>
+  <p:clrMapOvr>
+    <a:masterClrMapping/>
+  </p:clrMapOvr>
+  <p:timing>
+    <p:tnLst>
+      <p:par>
+        <p:cTn id="1" dur="indefinite" restart="never" nodeType="tmRoot">
+          <p:childTnLst>
+            <p:seq concurrent="1" nextAc="seek">
+              <p:cTn id="2" dur="indefinite" nodeType="mainSeq">
+                <p:childTnLst>
+                  <p:par>
+                    <p:cTn id="3" fill="hold">
+                      <p:stCondLst>
+                        <p:cond delay="indefinite"/>
+                      </p:stCondLst>
+                      <p:childTnLst>
+                        <p:par>
+                          <p:cTn id="4" fill="hold">
+                            <p:stCondLst>
+                              <p:cond delay="0"/>
+                            </p:stCondLst>
+                            <p:childTnLst>
+                              <p:par>
+                                <p:cTn id="5" presetID="2" presetClass="entr" presetSubtype="4" fill="hold" nodeType="clickEffect">
+                                  <p:stCondLst>
+                                    <p:cond delay="0"/>
+                                  </p:stCondLst>
+                                  <p:childTnLst>
+                                    <p:set>
+                                      <p:cBhvr>
+                                        <p:cTn id="6" dur="1" fill="hold">
+                                          <p:stCondLst>
+                                            <p:cond delay="0"/>
+                                          </p:stCondLst>
+                                        </p:cTn>
+                                        <p:tgtEl>
+                                          <p:spTgt spid="3075"/>
+                                        </p:tgtEl>
+                                        <p:attrNameLst>
+                                          <p:attrName>style.visibility</p:attrName>
+                                        </p:attrNameLst>
+                                      </p:cBhvr>
+                                      <p:to>
+                                        <p:strVal val="visible"/>
+                                      </p:to>
+                                    </p:set>
+                                    <p:anim calcmode="lin" valueType="num">
+                                      <p:cBhvr additive="base">
+                                        <p:cTn id="7" dur="500" fill="hold"/>
+                                        <p:tgtEl>
+                                          <p:spTgt spid="3075"/>
+                                        </p:tgtEl>
+                                        <p:attrNameLst>
+                                          <p:attrName>ppt_x</p:attrName>
+                                        </p:attrNameLst>
+                                      </p:cBhvr>
+                                      <p:tavLst>
+                                        <p:tav tm="0">
+                                          <p:val>
+                                            <p:strVal val="#ppt_x"/>
+                                          </p:val>
+                                        </p:tav>
+                                        <p:tav tm="100000">
+                                          <p:val>
+                                            <p:strVal val="#ppt_x"/>
+                                          </p:val>
+                                        </p:tav>
+                                      </p:tavLst>
+                                    </p:anim>
+                                    <p:anim calcmode="lin" valueType="num">
+                                      <p:cBhvr additive="base">
+                                        <p:cTn id="8" dur="500" fill="hold"/>
+                                        <p:tgtEl>
+                                          <p:spTgt spid="3075"/>
+                                        </p:tgtEl>
+                                        <p:attrNameLst>
+                                          <p:attrName>ppt_y</p:attrName>
+                                        </p:attrNameLst>
+                                      </p:cBhvr>
+                                      <p:tavLst>
+                                        <p:tav tm="0">
+                                          <p:val>
+                                            <p:strVal val="1+#ppt_h/2"/>
+                                          </p:val>
+                                        </p:tav>
+                                        <p:tav tm="100000">
+                                          <p:val>
+                                            <p:strVal val="#ppt_y"/>
+                                          </p:val>
+                                        </p:tav>
+                                      </p:tavLst>
+                                    </p:anim>
+                                  </p:childTnLst>
+                                </p:cTn>
+                              </p:par>
+                            </p:childTnLst>
+                          </p:cTn>
+                        </p:par>
+                      </p:childTnLst>
+                    </p:cTn>
+                  </p:par>
+                  <p:par>
+                    <p:cTn id="9" fill="hold">
+                      <p:stCondLst>
+                        <p:cond delay="indefinite"/>
+                      </p:stCondLst>
+                      <p:childTnLst>
+                        <p:par>
+                          <p:cTn id="10" fill="hold">
+                            <p:stCondLst>
+                              <p:cond delay="0"/>
+                            </p:stCondLst>
+                            <p:childTnLst>
+                              <p:par>
+                                <p:cTn id="11" presetID="10" presetClass="entr" presetSubtype="0" fill="hold" nodeType="clickEffect">
+                                  <p:stCondLst>
+                                    <p:cond delay="0"/>
+                                  </p:stCondLst>
+                                  <p:childTnLst>
+                                    <p:set>
+                                      <p:cBhvr>
+                                        <p:cTn id="12" dur="1" fill="hold">
+                                          <p:stCondLst>
+                                            <p:cond delay="0"/>
+                                          </p:stCondLst>
+                                        </p:cTn>
+                                        <p:tgtEl>
+                                          <p:spTgt spid="3076"/>
+                                        </p:tgtEl>
+                                        <p:attrNameLst>
+                                          <p:attrName>style.visibility</p:attrName>
+                                        </p:attrNameLst>
+                                      </p:cBhvr>
+                                      <p:to>
+                                        <p:strVal val="visible"/>
+                                      </p:to>
+                                    </p:set>
+                                    <p:animEffect transition="in" filter="fade">
+                                      <p:cBhvr>
+                                        <p:cTn id="13" dur="500"/>
+                                        <p:tgtEl>
+                                          <p:spTgt spid="3076"/>
+                                        </p:tgtEl>
+                                      </p:cBhvr>
+                                    </p:animEffect>
+                                  </p:childTnLst>
+                                </p:cTn>
+                              </p:par>
+                            </p:childTnLst>
+                          </p:cTn>
+                        </p:par>
+                      </p:childTnLst>
+                    </p:cTn>
+                  </p:par>
+                  <p:par>
+                    <p:cTn id="14" fill="hold">
+                      <p:stCondLst>
+                        <p:cond delay="indefinite"/>
+                      </p:stCondLst>
+                      <p:childTnLst>
+                        <p:par>
+                          <p:cTn id="15" fill="hold">
+                            <p:stCondLst>
+                              <p:cond delay="0"/>
+                            </p:stCondLst>
+                            <p:childTnLst>
+                              <p:par>
+                                <p:cTn id="16" presetID="1" presetClass="entr" presetSubtype="0" fill="hold" grpId="0" nodeType="clickEffect">
+                                  <p:stCondLst>
+                                    <p:cond delay="0"/>
+                                  </p:stCondLst>
+                                  <p:childTnLst>
+                                    <p:set>
+                                      <p:cBhvr>
+                                        <p:cTn id="17" dur="1" fill="hold">
+                                          <p:stCondLst>
+                                            <p:cond delay="0"/>
+                                          </p:stCondLst>
+                                        </p:cTn>
+                                        <p:tgtEl>
+                                          <p:spTgt spid="4"/>
+                                        </p:tgtEl>
+                                        <p:attrNameLst>
+                                          <p:attrName>style.visibility</p:attrName>
+                                        </p:attrNameLst>
+                                      </p:cBhvr>
+                                      <p:to>
+                                        <p:strVal val="visible"/>
+                                      </p:to>
+                                    </p:set>
+                                  </p:childTnLst>
+                                </p:cTn>
+                              </p:par>
+                            </p:childTnLst>
+                          </p:cTn>
+                        </p:par>
+                      </p:childTnLst>
+                    </p:cTn>
+                  </p:par>
+                  <p:par>
+                    <p:cTn id="18" fill="hold">
+                      <p:stCondLst>
+                        <p:cond delay="indefinite"/>
+                      </p:stCondLst>
+                      <p:childTnLst>
+                        <p:par>
+                          <p:cTn id="19" fill="hold">
+                            <p:stCondLst>
+                              <p:cond delay="0"/>
+                            </p:stCondLst>
+                            <p:childTnLst>
+                              <p:par>
+                                <p:cTn id="20" presetID="10" presetClass="entr" presetSubtype="0" fill="hold" nodeType="clickEffect">
+                                  <p:stCondLst>
+                                    <p:cond delay="0"/>
+                                  </p:stCondLst>
+                                  <p:childTnLst>
+                                    <p:set>
+                                      <p:cBhvr>
+                                        <p:cTn id="21" dur="1" fill="hold">
+                                          <p:stCondLst>
+                                            <p:cond delay="0"/>
+                                          </p:stCondLst>
+                                        </p:cTn>
+                                        <p:tgtEl>
+                                          <p:spTgt spid="3077"/>
+                                        </p:tgtEl>
+                                        <p:attrNameLst>
+                                          <p:attrName>style.visibility</p:attrName>
+                                        </p:attrNameLst>
+                                      </p:cBhvr>
+                                      <p:to>
+                                        <p:strVal val="visible"/>
+                                      </p:to>
+                                    </p:set>
+                                    <p:animEffect transition="in" filter="fade">
+                                      <p:cBhvr>
+                                        <p:cTn id="22" dur="500"/>
+                                        <p:tgtEl>
+                                          <p:spTgt spid="3077"/>
+                                        </p:tgtEl>
+                                      </p:cBhvr>
+                                    </p:animEffect>
+                                  </p:childTnLst>
+                                </p:cTn>
+                              </p:par>
+                            </p:childTnLst>
+                          </p:cTn>
+                        </p:par>
+                      </p:childTnLst>
+                    </p:cTn>
+                  </p:par>
+                  <p:par>
+                    <p:cTn id="23" fill="hold">
+                      <p:stCondLst>
+                        <p:cond delay="indefinite"/>
+                      </p:stCondLst>
+                      <p:childTnLst>
+                        <p:par>
+                          <p:cTn id="24" fill="hold">
+                            <p:stCondLst>
+                              <p:cond delay="0"/>
+                            </p:stCondLst>
+                            <p:childTnLst>
+                              <p:par>
+                                <p:cTn id="25" presetID="1" presetClass="entr" presetSubtype="0" fill="hold" grpId="0" nodeType="clickEffect">
+                                  <p:stCondLst>
+                                    <p:cond delay="0"/>
+                                  </p:stCondLst>
+                                  <p:childTnLst>
+                                    <p:set>
+                                      <p:cBhvr>
+                                        <p:cTn id="26" dur="1" fill="hold">
+                                          <p:stCondLst>
+                                            <p:cond delay="0"/>
+                                          </p:stCondLst>
+                                        </p:cTn>
+                                        <p:tgtEl>
+                                          <p:spTgt spid="5"/>
+                                        </p:tgtEl>
+                                        <p:attrNameLst>
+                                          <p:attrName>style.visibility</p:attrName>
+                                        </p:attrNameLst>
+                                      </p:cBhvr>
+                                      <p:to>
+                                        <p:strVal val="visible"/>
+                                      </p:to>
+                                    </p:set>
+                                  </p:childTnLst>
+                                </p:cTn>
+                              </p:par>
+                            </p:childTnLst>
+                          </p:cTn>
+                        </p:par>
+                      </p:childTnLst>
+                    </p:cTn>
+                  </p:par>
+                </p:childTnLst>
+              </p:cTn>
+              <p:prevCondLst>
+                <p:cond evt="onPrev" delay="0">
+                  <p:tgtEl>
+                    <p:sldTgt/>
+                  </p:tgtEl>
+                </p:cond>
+              </p:prevCondLst>
+              <p:nextCondLst>
+                <p:cond evt="onNext" delay="0">
+                  <p:tgtEl>
+                    <p:sldTgt/>
+                  </p:tgtEl>
+                </p:cond>
+              </p:nextCondLst>
+            </p:seq>
+          </p:childTnLst>
+        </p:cTn>
+      </p:par>
+    </p:tnLst>
+    <p:bldLst>
+      <p:bldP spid="4" grpId="0" animBg="1"/>
+      <p:bldP spid="5" grpId="0" animBg="1"/>
+    </p:bldLst>
+  </p:timing>
+</p:sld>
+</file>
+
+<file path=ppt/slides/slide8.xml><?xml version="1.0" encoding="utf-8"?>
+<p:sld xmlns:a="http://schemas.openxmlformats.org/drawingml/2006/main" xmlns:r="http://schemas.openxmlformats.org/officeDocument/2006/relationships" xmlns:p="http://schemas.openxmlformats.org/presentationml/2006/main">
+  <p:cSld>
+    <p:spTree>
+      <p:nvGrpSpPr>
+        <p:cNvPr id="1" name=""/>
+        <p:cNvGrpSpPr/>
+        <p:nvPr/>
+      </p:nvGrpSpPr>
+      <p:grpSpPr>
+        <a:xfrm>
+          <a:off x="0" y="0"/>
+          <a:ext cx="0" cy="0"/>
+          <a:chOff x="0" y="0"/>
+          <a:chExt cx="0" cy="0"/>
+        </a:xfrm>
+      </p:grpSpPr>
+      <p:sp>
+        <p:nvSpPr>
+          <p:cNvPr id="4" name="3 CuadroTexto"/>
+          <p:cNvSpPr txBox="1"/>
+          <p:nvPr/>
+        </p:nvSpPr>
+        <p:spPr>
+          <a:xfrm>
+            <a:off x="107504" y="2492896"/>
+            <a:ext cx="9433048" cy="923330"/>
+          </a:xfrm>
+          <a:prstGeom prst="rect">
+            <a:avLst/>
+          </a:prstGeom>
+          <a:noFill/>
+        </p:spPr>
+        <p:txBody>
+          <a:bodyPr wrap="square" rtlCol="0">
+            <a:spAutoFit/>
+          </a:bodyPr>
+          <a:lstStyle/>
+          <a:p>
+            <a:r>
+              <a:rPr lang="es-CL" sz="5400" dirty="0" smtClean="0"/>
+              <a:t>¡¡¡Gracias por su atención!!!</a:t>
+            </a:r>
+            <a:endParaRPr lang="es-CL" sz="5400" dirty="0"/>
+          </a:p>
+        </p:txBody>
+      </p:sp>
+    </p:spTree>
+    <p:extLst>
+      <p:ext uri="{BB962C8B-B14F-4D97-AF65-F5344CB8AC3E}">
+        <p14:creationId xmlns:p14="http://schemas.microsoft.com/office/powerpoint/2010/main" val="1685901768"/>
       </p:ext>
     </p:extLst>
   </p:cSld>
@@ -5985,7 +7740,7 @@
         <a:font script="Geor" typeface="Sylfaen"/>
       </a:minorFont>
     </a:fontScheme>
-    <a:fmtScheme name="Urbano">
+    <a:fmtScheme name="Office">
       <a:fillStyleLst>
         <a:solidFill>
           <a:schemeClr val="phClr"/>
@@ -5994,66 +7749,66 @@
           <a:gsLst>
             <a:gs pos="0">
               <a:schemeClr val="phClr">
-                <a:tint val="1000"/>
-                <a:satMod val="255000"/>
+                <a:tint val="50000"/>
+                <a:satMod val="300000"/>
               </a:schemeClr>
             </a:gs>
-            <a:gs pos="55000">
+            <a:gs pos="35000">
               <a:schemeClr val="phClr">
-                <a:tint val="12000"/>
-                <a:satMod val="255000"/>
+                <a:tint val="37000"/>
+                <a:satMod val="300000"/>
               </a:schemeClr>
             </a:gs>
             <a:gs pos="100000">
               <a:schemeClr val="phClr">
-                <a:tint val="45000"/>
-                <a:satMod val="250000"/>
+                <a:tint val="15000"/>
+                <a:satMod val="350000"/>
               </a:schemeClr>
             </a:gs>
           </a:gsLst>
-          <a:path path="circle">
-            <a:fillToRect l="-40000" t="-90000" r="140000" b="190000"/>
-          </a:path>
+          <a:lin ang="16200000" scaled="1"/>
         </a:gradFill>
         <a:gradFill rotWithShape="1">
           <a:gsLst>
             <a:gs pos="0">
               <a:schemeClr val="phClr">
-                <a:tint val="43000"/>
-                <a:satMod val="165000"/>
+                <a:shade val="51000"/>
+                <a:satMod val="130000"/>
               </a:schemeClr>
             </a:gs>
-            <a:gs pos="55000">
+            <a:gs pos="80000">
               <a:schemeClr val="phClr">
-                <a:tint val="83000"/>
-                <a:satMod val="155000"/>
+                <a:shade val="93000"/>
+                <a:satMod val="130000"/>
               </a:schemeClr>
             </a:gs>
             <a:gs pos="100000">
               <a:schemeClr val="phClr">
-                <a:shade val="85000"/>
+                <a:shade val="94000"/>
+                <a:satMod val="135000"/>
               </a:schemeClr>
             </a:gs>
           </a:gsLst>
-          <a:path path="circle">
-            <a:fillToRect l="-40000" t="-90000" r="140000" b="190000"/>
-          </a:path>
+          <a:lin ang="16200000" scaled="0"/>
         </a:gradFill>
       </a:fillStyleLst>
       <a:lnStyleLst>
         <a:ln w="9525" cap="flat" cmpd="sng" algn="ctr">
           <a:solidFill>
-            <a:schemeClr val="phClr"/>
+            <a:schemeClr val="phClr">
+              <a:shade val="95000"/>
+              <a:satMod val="105000"/>
+            </a:schemeClr>
           </a:solidFill>
           <a:prstDash val="solid"/>
         </a:ln>
-        <a:ln w="19050" cap="flat" cmpd="sng" algn="ctr">
+        <a:ln w="25400" cap="flat" cmpd="sng" algn="ctr">
           <a:solidFill>
             <a:schemeClr val="phClr"/>
           </a:solidFill>
           <a:prstDash val="solid"/>
         </a:ln>
-        <a:ln w="31750" cap="flat" cmpd="sng" algn="ctr">
+        <a:ln w="38100" cap="flat" cmpd="sng" algn="ctr">
           <a:solidFill>
             <a:schemeClr val="phClr"/>
           </a:solidFill>
@@ -6063,45 +7818,40 @@
       <a:effectStyleLst>
         <a:effectStyle>
           <a:effectLst>
-            <a:outerShdw blurRad="51500" dist="25400" dir="5400000" rotWithShape="0">
+            <a:outerShdw blurRad="40000" dist="20000" dir="5400000" rotWithShape="0">
               <a:srgbClr val="000000">
-                <a:alpha val="40000"/>
+                <a:alpha val="38000"/>
               </a:srgbClr>
             </a:outerShdw>
           </a:effectLst>
         </a:effectStyle>
         <a:effectStyle>
           <a:effectLst>
-            <a:outerShdw blurRad="50800" dist="25400" dir="5400000" rotWithShape="0">
+            <a:outerShdw blurRad="40000" dist="23000" dir="5400000" rotWithShape="0">
               <a:srgbClr val="000000">
-                <a:alpha val="45000"/>
+                <a:alpha val="35000"/>
               </a:srgbClr>
             </a:outerShdw>
           </a:effectLst>
         </a:effectStyle>
         <a:effectStyle>
           <a:effectLst>
-            <a:outerShdw blurRad="50800" dist="25400" dir="5400000" rotWithShape="0">
+            <a:outerShdw blurRad="40000" dist="23000" dir="5400000" rotWithShape="0">
               <a:srgbClr val="000000">
-                <a:alpha val="45000"/>
+                <a:alpha val="35000"/>
               </a:srgbClr>
             </a:outerShdw>
           </a:effectLst>
           <a:scene3d>
-            <a:camera prst="orthographicFront" fov="0">
+            <a:camera prst="orthographicFront">
               <a:rot lat="0" lon="0" rev="0"/>
             </a:camera>
-            <a:lightRig rig="flat" dir="t">
-              <a:rot lat="0" lon="0" rev="20040000"/>
+            <a:lightRig rig="threePt" dir="t">
+              <a:rot lat="0" lon="0" rev="1200000"/>
             </a:lightRig>
           </a:scene3d>
-          <a:sp3d contourW="12700" prstMaterial="dkEdge">
-            <a:bevelT w="25400" h="38100" prst="convex"/>
-            <a:contourClr>
-              <a:schemeClr val="phClr">
-                <a:satMod val="115000"/>
-              </a:schemeClr>
-            </a:contourClr>
+          <a:sp3d>
+            <a:bevelT w="63500" h="25400"/>
           </a:sp3d>
         </a:effectStyle>
       </a:effectStyleLst>

</xml_diff>